<commit_message>
Allowing resource optimized OpenStack
One option for the deployment of edge cloud infrastructures
is to use different instances of the same resource optimized
OpenStack in both the large, medium and small edge sites.

This change adds this as an alternative to the usage of
different OpenStack deployment variants in the different
sites.

Change-Id: Icdcdb7fb8b0cb43f36b2f53ef74278475aa9817e
Signed-off-by: Gergely Csatari <gergely.csatari@nokia.com>
</commit_message>
<xml_diff>
--- a/docs/development/requirements/images/figure-sources.pptx
+++ b/docs/development/requirements/images/figure-sources.pptx
@@ -122,23 +122,24 @@
   <pc:docChgLst>
     <pc:chgData name="Csatari, Gergely (Nokia - HU/Budapest)" userId="f5bffca3-77e4-4f86-ab35-a6eae4fbf322" providerId="ADAL" clId="{A97CE7F1-8510-462F-AB9E-1E80402E586D}"/>
     <pc:docChg chg="addSld delSld modSld">
-      <pc:chgData name="Csatari, Gergely (Nokia - HU/Budapest)" userId="f5bffca3-77e4-4f86-ab35-a6eae4fbf322" providerId="ADAL" clId="{A97CE7F1-8510-462F-AB9E-1E80402E586D}" dt="2018-08-29T12:44:23.508" v="3" actId="20577"/>
+      <pc:chgData name="Csatari, Gergely (Nokia - HU/Budapest)" userId="f5bffca3-77e4-4f86-ab35-a6eae4fbf322" providerId="ADAL" clId="{A97CE7F1-8510-462F-AB9E-1E80402E586D}" dt="2018-10-18T08:05:19.869" v="6" actId="6549"/>
       <pc:docMkLst>
         <pc:docMk/>
       </pc:docMkLst>
-      <pc:sldChg chg="del">
-        <pc:chgData name="Csatari, Gergely (Nokia - HU/Budapest)" userId="f5bffca3-77e4-4f86-ab35-a6eae4fbf322" providerId="ADAL" clId="{A97CE7F1-8510-462F-AB9E-1E80402E586D}" dt="2018-08-29T12:38:10.201" v="1" actId="2696"/>
-        <pc:sldMkLst>
-          <pc:docMk/>
-          <pc:sldMk cId="480702554" sldId="289"/>
-        </pc:sldMkLst>
-      </pc:sldChg>
       <pc:sldChg chg="modSp add">
-        <pc:chgData name="Csatari, Gergely (Nokia - HU/Budapest)" userId="f5bffca3-77e4-4f86-ab35-a6eae4fbf322" providerId="ADAL" clId="{A97CE7F1-8510-462F-AB9E-1E80402E586D}" dt="2018-08-29T12:44:23.508" v="3" actId="20577"/>
+        <pc:chgData name="Csatari, Gergely (Nokia - HU/Budapest)" userId="f5bffca3-77e4-4f86-ab35-a6eae4fbf322" providerId="ADAL" clId="{A97CE7F1-8510-462F-AB9E-1E80402E586D}" dt="2018-10-18T08:05:19.869" v="6" actId="6549"/>
         <pc:sldMkLst>
           <pc:docMk/>
           <pc:sldMk cId="1019781063" sldId="290"/>
         </pc:sldMkLst>
+        <pc:spChg chg="mod">
+          <ac:chgData name="Csatari, Gergely (Nokia - HU/Budapest)" userId="f5bffca3-77e4-4f86-ab35-a6eae4fbf322" providerId="ADAL" clId="{A97CE7F1-8510-462F-AB9E-1E80402E586D}" dt="2018-10-18T08:05:19.869" v="6" actId="6549"/>
+          <ac:spMkLst>
+            <pc:docMk/>
+            <pc:sldMk cId="1019781063" sldId="290"/>
+            <ac:spMk id="16" creationId="{F8ED39A8-1377-4641-955B-B363CC431355}"/>
+          </ac:spMkLst>
+        </pc:spChg>
         <pc:spChg chg="mod">
           <ac:chgData name="Csatari, Gergely (Nokia - HU/Budapest)" userId="f5bffca3-77e4-4f86-ab35-a6eae4fbf322" providerId="ADAL" clId="{A97CE7F1-8510-462F-AB9E-1E80402E586D}" dt="2018-08-29T12:44:23.508" v="3" actId="20577"/>
           <ac:spMkLst>
@@ -235,7 +236,7 @@
           <a:p>
             <a:fld id="{89B6AE7C-67A4-4638-82BF-982C440F83D2}" type="datetimeFigureOut">
               <a:rPr lang="zh-CN" altLang="en-US" smtClean="0"/>
-              <a:t>2018/8/29</a:t>
+              <a:t>2018/10/18</a:t>
             </a:fld>
             <a:endParaRPr lang="zh-CN" altLang="en-US"/>
           </a:p>
@@ -829,7 +830,7 @@
           <a:p>
             <a:fld id="{FB49822E-6889-48F5-8B4A-D54E35E7692A}" type="datetimeFigureOut">
               <a:rPr lang="zh-CN" altLang="en-US" smtClean="0"/>
-              <a:t>2018/8/29</a:t>
+              <a:t>2018/10/18</a:t>
             </a:fld>
             <a:endParaRPr lang="zh-CN" altLang="en-US"/>
           </a:p>
@@ -1027,7 +1028,7 @@
           <a:p>
             <a:fld id="{FB49822E-6889-48F5-8B4A-D54E35E7692A}" type="datetimeFigureOut">
               <a:rPr lang="zh-CN" altLang="en-US" smtClean="0"/>
-              <a:t>2018/8/29</a:t>
+              <a:t>2018/10/18</a:t>
             </a:fld>
             <a:endParaRPr lang="zh-CN" altLang="en-US"/>
           </a:p>
@@ -1235,7 +1236,7 @@
           <a:p>
             <a:fld id="{FB49822E-6889-48F5-8B4A-D54E35E7692A}" type="datetimeFigureOut">
               <a:rPr lang="zh-CN" altLang="en-US" smtClean="0"/>
-              <a:t>2018/8/29</a:t>
+              <a:t>2018/10/18</a:t>
             </a:fld>
             <a:endParaRPr lang="zh-CN" altLang="en-US"/>
           </a:p>
@@ -1433,7 +1434,7 @@
           <a:p>
             <a:fld id="{FB49822E-6889-48F5-8B4A-D54E35E7692A}" type="datetimeFigureOut">
               <a:rPr lang="zh-CN" altLang="en-US" smtClean="0"/>
-              <a:t>2018/8/29</a:t>
+              <a:t>2018/10/18</a:t>
             </a:fld>
             <a:endParaRPr lang="zh-CN" altLang="en-US"/>
           </a:p>
@@ -1708,7 +1709,7 @@
           <a:p>
             <a:fld id="{FB49822E-6889-48F5-8B4A-D54E35E7692A}" type="datetimeFigureOut">
               <a:rPr lang="zh-CN" altLang="en-US" smtClean="0"/>
-              <a:t>2018/8/29</a:t>
+              <a:t>2018/10/18</a:t>
             </a:fld>
             <a:endParaRPr lang="zh-CN" altLang="en-US"/>
           </a:p>
@@ -1973,7 +1974,7 @@
           <a:p>
             <a:fld id="{FB49822E-6889-48F5-8B4A-D54E35E7692A}" type="datetimeFigureOut">
               <a:rPr lang="zh-CN" altLang="en-US" smtClean="0"/>
-              <a:t>2018/8/29</a:t>
+              <a:t>2018/10/18</a:t>
             </a:fld>
             <a:endParaRPr lang="zh-CN" altLang="en-US"/>
           </a:p>
@@ -2385,7 +2386,7 @@
           <a:p>
             <a:fld id="{FB49822E-6889-48F5-8B4A-D54E35E7692A}" type="datetimeFigureOut">
               <a:rPr lang="zh-CN" altLang="en-US" smtClean="0"/>
-              <a:t>2018/8/29</a:t>
+              <a:t>2018/10/18</a:t>
             </a:fld>
             <a:endParaRPr lang="zh-CN" altLang="en-US"/>
           </a:p>
@@ -2526,7 +2527,7 @@
           <a:p>
             <a:fld id="{FB49822E-6889-48F5-8B4A-D54E35E7692A}" type="datetimeFigureOut">
               <a:rPr lang="zh-CN" altLang="en-US" smtClean="0"/>
-              <a:t>2018/8/29</a:t>
+              <a:t>2018/10/18</a:t>
             </a:fld>
             <a:endParaRPr lang="zh-CN" altLang="en-US"/>
           </a:p>
@@ -2639,7 +2640,7 @@
           <a:p>
             <a:fld id="{FB49822E-6889-48F5-8B4A-D54E35E7692A}" type="datetimeFigureOut">
               <a:rPr lang="zh-CN" altLang="en-US" smtClean="0"/>
-              <a:t>2018/8/29</a:t>
+              <a:t>2018/10/18</a:t>
             </a:fld>
             <a:endParaRPr lang="zh-CN" altLang="en-US"/>
           </a:p>
@@ -2950,7 +2951,7 @@
           <a:p>
             <a:fld id="{FB49822E-6889-48F5-8B4A-D54E35E7692A}" type="datetimeFigureOut">
               <a:rPr lang="zh-CN" altLang="en-US" smtClean="0"/>
-              <a:t>2018/8/29</a:t>
+              <a:t>2018/10/18</a:t>
             </a:fld>
             <a:endParaRPr lang="zh-CN" altLang="en-US"/>
           </a:p>
@@ -3238,7 +3239,7 @@
           <a:p>
             <a:fld id="{FB49822E-6889-48F5-8B4A-D54E35E7692A}" type="datetimeFigureOut">
               <a:rPr lang="zh-CN" altLang="en-US" smtClean="0"/>
-              <a:t>2018/8/29</a:t>
+              <a:t>2018/10/18</a:t>
             </a:fld>
             <a:endParaRPr lang="zh-CN" altLang="en-US"/>
           </a:p>
@@ -3479,7 +3480,7 @@
           <a:p>
             <a:fld id="{FB49822E-6889-48F5-8B4A-D54E35E7692A}" type="datetimeFigureOut">
               <a:rPr lang="zh-CN" altLang="en-US" smtClean="0"/>
-              <a:t>2018/8/29</a:t>
+              <a:t>2018/10/18</a:t>
             </a:fld>
             <a:endParaRPr lang="zh-CN" altLang="en-US"/>
           </a:p>
@@ -4144,7 +4145,7 @@
             <a:ln/>
             <a:extLst>
               <a:ext uri="{AF507438-7753-43e0-B8FC-AC1667EBCBE1}">
-                <a14:hiddenEffects xmlns:lc="http://schemas.openxmlformats.org/drawingml/2006/lockedCanvas" xmlns:a14="http://schemas.microsoft.com/office/drawing/2010/main" xmlns="">
+                <a14:hiddenEffects xmlns="" xmlns:a14="http://schemas.microsoft.com/office/drawing/2010/main" xmlns:lc="http://schemas.openxmlformats.org/drawingml/2006/lockedCanvas">
                   <a:effectLst>
                     <a:outerShdw dist="35921" dir="2700000" algn="ctr" rotWithShape="0">
                       <a:schemeClr val="bg2"/>
@@ -4342,7 +4343,7 @@
             <a:ln/>
             <a:extLst>
               <a:ext uri="{AF507438-7753-43e0-B8FC-AC1667EBCBE1}">
-                <a14:hiddenEffects xmlns:lc="http://schemas.openxmlformats.org/drawingml/2006/lockedCanvas" xmlns:a14="http://schemas.microsoft.com/office/drawing/2010/main" xmlns="">
+                <a14:hiddenEffects xmlns="" xmlns:a14="http://schemas.microsoft.com/office/drawing/2010/main" xmlns:lc="http://schemas.openxmlformats.org/drawingml/2006/lockedCanvas">
                   <a:effectLst>
                     <a:outerShdw dist="35921" dir="2700000" algn="ctr" rotWithShape="0">
                       <a:schemeClr val="bg2"/>
@@ -4611,7 +4612,7 @@
             <a:effectLst/>
             <a:extLst>
               <a:ext uri="{AF507438-7753-43e0-B8FC-AC1667EBCBE1}">
-                <a14:hiddenEffects xmlns:lc="http://schemas.openxmlformats.org/drawingml/2006/lockedCanvas" xmlns:a14="http://schemas.microsoft.com/office/drawing/2010/main" xmlns="">
+                <a14:hiddenEffects xmlns="" xmlns:a14="http://schemas.microsoft.com/office/drawing/2010/main" xmlns:lc="http://schemas.openxmlformats.org/drawingml/2006/lockedCanvas">
                   <a:effectLst>
                     <a:outerShdw dist="35921" dir="2700000" algn="ctr" rotWithShape="0">
                       <a:schemeClr val="bg2"/>
@@ -4811,7 +4812,7 @@
             </a:ln>
             <a:extLst>
               <a:ext uri="{AF507438-7753-43e0-B8FC-AC1667EBCBE1}">
-                <a14:hiddenEffects xmlns:lc="http://schemas.openxmlformats.org/drawingml/2006/lockedCanvas" xmlns:a14="http://schemas.microsoft.com/office/drawing/2010/main" xmlns="">
+                <a14:hiddenEffects xmlns="" xmlns:a14="http://schemas.microsoft.com/office/drawing/2010/main" xmlns:lc="http://schemas.openxmlformats.org/drawingml/2006/lockedCanvas">
                   <a:effectLst>
                     <a:outerShdw dist="35921" dir="2700000" algn="ctr" rotWithShape="0">
                       <a:schemeClr val="bg2"/>
@@ -5424,7 +5425,7 @@
                   <a:latin typeface="微软雅黑" pitchFamily="34" charset="-122"/>
                   <a:ea typeface="微软雅黑" pitchFamily="34" charset="-122"/>
                 </a:rPr>
-                <a:t>LW OpenStack</a:t>
+                <a:t>OpenStack</a:t>
               </a:r>
               <a:endParaRPr lang="zh-CN" altLang="en-US" sz="1200" dirty="0">
                 <a:solidFill>
@@ -5461,7 +5462,7 @@
             <a:ln/>
             <a:extLst>
               <a:ext uri="{AF507438-7753-43e0-B8FC-AC1667EBCBE1}">
-                <a14:hiddenEffects xmlns:lc="http://schemas.openxmlformats.org/drawingml/2006/lockedCanvas" xmlns:a14="http://schemas.microsoft.com/office/drawing/2010/main" xmlns="">
+                <a14:hiddenEffects xmlns="" xmlns:a14="http://schemas.microsoft.com/office/drawing/2010/main" xmlns:lc="http://schemas.openxmlformats.org/drawingml/2006/lockedCanvas">
                   <a:effectLst>
                     <a:outerShdw dist="35921" dir="2700000" algn="ctr" rotWithShape="0">
                       <a:schemeClr val="bg2"/>
@@ -5820,7 +5821,7 @@
             <a:ln/>
             <a:extLst>
               <a:ext uri="{AF507438-7753-43e0-B8FC-AC1667EBCBE1}">
-                <a14:hiddenEffects xmlns:lc="http://schemas.openxmlformats.org/drawingml/2006/lockedCanvas" xmlns:a14="http://schemas.microsoft.com/office/drawing/2010/main" xmlns="">
+                <a14:hiddenEffects xmlns="" xmlns:a14="http://schemas.microsoft.com/office/drawing/2010/main" xmlns:lc="http://schemas.openxmlformats.org/drawingml/2006/lockedCanvas">
                   <a:effectLst>
                     <a:outerShdw dist="35921" dir="2700000" algn="ctr" rotWithShape="0">
                       <a:schemeClr val="bg2"/>
@@ -6100,7 +6101,7 @@
             <a:ln/>
             <a:extLst>
               <a:ext uri="{AF507438-7753-43e0-B8FC-AC1667EBCBE1}">
-                <a14:hiddenEffects xmlns:lc="http://schemas.openxmlformats.org/drawingml/2006/lockedCanvas" xmlns:a14="http://schemas.microsoft.com/office/drawing/2010/main" xmlns="">
+                <a14:hiddenEffects xmlns="" xmlns:a14="http://schemas.microsoft.com/office/drawing/2010/main" xmlns:lc="http://schemas.openxmlformats.org/drawingml/2006/lockedCanvas">
                   <a:effectLst>
                     <a:outerShdw dist="35921" dir="2700000" algn="ctr" rotWithShape="0">
                       <a:schemeClr val="bg2"/>
@@ -7142,7 +7143,7 @@
             <a:ln/>
             <a:extLst>
               <a:ext uri="{AF507438-7753-43e0-B8FC-AC1667EBCBE1}">
-                <a14:hiddenEffects xmlns:lc="http://schemas.openxmlformats.org/drawingml/2006/lockedCanvas" xmlns:a14="http://schemas.microsoft.com/office/drawing/2010/main" xmlns="">
+                <a14:hiddenEffects xmlns="" xmlns:a14="http://schemas.microsoft.com/office/drawing/2010/main" xmlns:lc="http://schemas.openxmlformats.org/drawingml/2006/lockedCanvas">
                   <a:effectLst>
                     <a:outerShdw dist="35921" dir="2700000" algn="ctr" rotWithShape="0">
                       <a:schemeClr val="bg2"/>
@@ -7443,7 +7444,7 @@
             <a:effectLst/>
             <a:extLst>
               <a:ext uri="{AF507438-7753-43e0-B8FC-AC1667EBCBE1}">
-                <a14:hiddenEffects xmlns:lc="http://schemas.openxmlformats.org/drawingml/2006/lockedCanvas" xmlns:a14="http://schemas.microsoft.com/office/drawing/2010/main" xmlns="">
+                <a14:hiddenEffects xmlns="" xmlns:a14="http://schemas.microsoft.com/office/drawing/2010/main" xmlns:lc="http://schemas.openxmlformats.org/drawingml/2006/lockedCanvas">
                   <a:effectLst>
                     <a:outerShdw dist="35921" dir="2700000" algn="ctr" rotWithShape="0">
                       <a:schemeClr val="bg2"/>
@@ -8261,7 +8262,7 @@
             <a:effectLst/>
             <a:extLst>
               <a:ext uri="{AF507438-7753-43e0-B8FC-AC1667EBCBE1}">
-                <a14:hiddenEffects xmlns:lc="http://schemas.openxmlformats.org/drawingml/2006/lockedCanvas" xmlns:a14="http://schemas.microsoft.com/office/drawing/2010/main" xmlns="">
+                <a14:hiddenEffects xmlns="" xmlns:a14="http://schemas.microsoft.com/office/drawing/2010/main" xmlns:lc="http://schemas.openxmlformats.org/drawingml/2006/lockedCanvas">
                   <a:effectLst>
                     <a:outerShdw dist="35921" dir="2700000" algn="ctr" rotWithShape="0">
                       <a:schemeClr val="bg2"/>
@@ -8626,7 +8627,7 @@
             <a:ln/>
             <a:extLst>
               <a:ext uri="{AF507438-7753-43e0-B8FC-AC1667EBCBE1}">
-                <a14:hiddenEffects xmlns:lc="http://schemas.openxmlformats.org/drawingml/2006/lockedCanvas" xmlns:a14="http://schemas.microsoft.com/office/drawing/2010/main" xmlns="">
+                <a14:hiddenEffects xmlns="" xmlns:a14="http://schemas.microsoft.com/office/drawing/2010/main" xmlns:lc="http://schemas.openxmlformats.org/drawingml/2006/lockedCanvas">
                   <a:effectLst>
                     <a:outerShdw dist="35921" dir="2700000" algn="ctr" rotWithShape="0">
                       <a:schemeClr val="bg2"/>
@@ -8922,7 +8923,7 @@
             <a:ln/>
             <a:extLst>
               <a:ext uri="{AF507438-7753-43e0-B8FC-AC1667EBCBE1}">
-                <a14:hiddenEffects xmlns:lc="http://schemas.openxmlformats.org/drawingml/2006/lockedCanvas" xmlns:a14="http://schemas.microsoft.com/office/drawing/2010/main" xmlns="">
+                <a14:hiddenEffects xmlns="" xmlns:a14="http://schemas.microsoft.com/office/drawing/2010/main" xmlns:lc="http://schemas.openxmlformats.org/drawingml/2006/lockedCanvas">
                   <a:effectLst>
                     <a:outerShdw dist="35921" dir="2700000" algn="ctr" rotWithShape="0">
                       <a:schemeClr val="bg2"/>
@@ -9335,7 +9336,7 @@
             <a:ln/>
             <a:extLst>
               <a:ext uri="{AF507438-7753-43e0-B8FC-AC1667EBCBE1}">
-                <a14:hiddenEffects xmlns:lc="http://schemas.openxmlformats.org/drawingml/2006/lockedCanvas" xmlns:a14="http://schemas.microsoft.com/office/drawing/2010/main" xmlns="">
+                <a14:hiddenEffects xmlns="" xmlns:a14="http://schemas.microsoft.com/office/drawing/2010/main" xmlns:lc="http://schemas.openxmlformats.org/drawingml/2006/lockedCanvas">
                   <a:effectLst>
                     <a:outerShdw dist="35921" dir="2700000" algn="ctr" rotWithShape="0">
                       <a:schemeClr val="bg2"/>
@@ -9914,7 +9915,7 @@
                 </a:ln>
                 <a:extLst>
                   <a:ext uri="{AF507438-7753-43e0-B8FC-AC1667EBCBE1}">
-                    <a14:hiddenEffects xmlns:lc="http://schemas.openxmlformats.org/drawingml/2006/lockedCanvas" xmlns:a14="http://schemas.microsoft.com/office/drawing/2010/main" xmlns="">
+                    <a14:hiddenEffects xmlns="" xmlns:a14="http://schemas.microsoft.com/office/drawing/2010/main" xmlns:lc="http://schemas.openxmlformats.org/drawingml/2006/lockedCanvas">
                       <a:effectLst>
                         <a:outerShdw dist="35921" dir="2700000" algn="ctr" rotWithShape="0">
                           <a:schemeClr val="bg2"/>
@@ -10624,7 +10625,7 @@
               </a:ln>
               <a:extLst>
                 <a:ext uri="{AF507438-7753-43e0-B8FC-AC1667EBCBE1}">
-                  <a14:hiddenEffects xmlns:lc="http://schemas.openxmlformats.org/drawingml/2006/lockedCanvas" xmlns:a14="http://schemas.microsoft.com/office/drawing/2010/main" xmlns="">
+                  <a14:hiddenEffects xmlns="" xmlns:a14="http://schemas.microsoft.com/office/drawing/2010/main" xmlns:lc="http://schemas.openxmlformats.org/drawingml/2006/lockedCanvas">
                     <a:effectLst>
                       <a:outerShdw dist="35921" dir="2700000" algn="ctr" rotWithShape="0">
                         <a:schemeClr val="bg2"/>
@@ -11728,7 +11729,7 @@
             <a:ln/>
             <a:extLst>
               <a:ext uri="{AF507438-7753-43e0-B8FC-AC1667EBCBE1}">
-                <a14:hiddenEffects xmlns:lc="http://schemas.openxmlformats.org/drawingml/2006/lockedCanvas" xmlns:a14="http://schemas.microsoft.com/office/drawing/2010/main" xmlns="">
+                <a14:hiddenEffects xmlns="" xmlns:a14="http://schemas.microsoft.com/office/drawing/2010/main" xmlns:lc="http://schemas.openxmlformats.org/drawingml/2006/lockedCanvas">
                   <a:effectLst>
                     <a:outerShdw dist="35921" dir="2700000" algn="ctr" rotWithShape="0">
                       <a:schemeClr val="bg2"/>

</xml_diff>